<commit_message>
Added Interview and changes to presentation
</commit_message>
<xml_diff>
--- a/doc/CS1_Task3/Task3_Design_Thinking.pptx
+++ b/doc/CS1_Task3/Task3_Design_Thinking.pptx
@@ -5,7 +5,7 @@
     <p:sldMasterId id="2147483905" r:id="rId1"/>
   </p:sldMasterIdLst>
   <p:notesMasterIdLst>
-    <p:notesMasterId r:id="rId11"/>
+    <p:notesMasterId r:id="rId12"/>
   </p:notesMasterIdLst>
   <p:sldIdLst>
     <p:sldId id="256" r:id="rId2"/>
@@ -16,7 +16,8 @@
     <p:sldId id="272" r:id="rId7"/>
     <p:sldId id="273" r:id="rId8"/>
     <p:sldId id="274" r:id="rId9"/>
-    <p:sldId id="276" r:id="rId10"/>
+    <p:sldId id="277" r:id="rId10"/>
+    <p:sldId id="276" r:id="rId11"/>
   </p:sldIdLst>
   <p:sldSz cx="9144000" cy="6858000" type="screen4x3"/>
   <p:notesSz cx="6858000" cy="9144000"/>
@@ -1011,7 +1012,7 @@
             </a:ln>
             <a:extLst>
               <a:ext uri="{91240B29-F687-4f45-9708-019B960494DF}">
-                <a14:hiddenLine xmlns="" xmlns:a14="http://schemas.microsoft.com/office/drawing/2010/main" w="9525">
+                <a14:hiddenLine xmlns:a14="http://schemas.microsoft.com/office/drawing/2010/main" xmlns="" w="9525">
                   <a:solidFill>
                     <a:srgbClr val="000000"/>
                   </a:solidFill>
@@ -2109,7 +2110,7 @@
             </a:ln>
             <a:extLst>
               <a:ext uri="{91240B29-F687-4f45-9708-019B960494DF}">
-                <a14:hiddenLine xmlns="" xmlns:a14="http://schemas.microsoft.com/office/drawing/2010/main" w="9525">
+                <a14:hiddenLine xmlns:a14="http://schemas.microsoft.com/office/drawing/2010/main" xmlns="" w="9525">
                   <a:solidFill>
                     <a:srgbClr val="000000"/>
                   </a:solidFill>
@@ -3212,7 +3213,7 @@
             </a:ln>
             <a:extLst>
               <a:ext uri="{91240B29-F687-4f45-9708-019B960494DF}">
-                <a14:hiddenLine xmlns="" xmlns:a14="http://schemas.microsoft.com/office/drawing/2010/main" w="9525">
+                <a14:hiddenLine xmlns:a14="http://schemas.microsoft.com/office/drawing/2010/main" xmlns="" w="9525">
                   <a:solidFill>
                     <a:srgbClr val="000000"/>
                   </a:solidFill>
@@ -4190,7 +4191,7 @@
             </a:ln>
             <a:extLst>
               <a:ext uri="{91240B29-F687-4f45-9708-019B960494DF}">
-                <a14:hiddenLine xmlns="" xmlns:a14="http://schemas.microsoft.com/office/drawing/2010/main" w="9525">
+                <a14:hiddenLine xmlns:a14="http://schemas.microsoft.com/office/drawing/2010/main" xmlns="" w="9525">
                   <a:solidFill>
                     <a:srgbClr val="000000"/>
                   </a:solidFill>
@@ -5322,7 +5323,7 @@
             </a:ln>
             <a:extLst>
               <a:ext uri="{91240B29-F687-4f45-9708-019B960494DF}">
-                <a14:hiddenLine xmlns="" xmlns:a14="http://schemas.microsoft.com/office/drawing/2010/main" w="9525">
+                <a14:hiddenLine xmlns:a14="http://schemas.microsoft.com/office/drawing/2010/main" xmlns="" w="9525">
                   <a:solidFill>
                     <a:srgbClr val="000000"/>
                   </a:solidFill>
@@ -8126,7 +8127,7 @@
           </a:ln>
           <a:extLst>
             <a:ext uri="{91240B29-F687-4f45-9708-019B960494DF}">
-              <a14:hiddenLine xmlns="" xmlns:a14="http://schemas.microsoft.com/office/drawing/2010/main" w="9525">
+              <a14:hiddenLine xmlns:a14="http://schemas.microsoft.com/office/drawing/2010/main" xmlns="" w="9525">
                 <a:solidFill>
                   <a:srgbClr val="000000"/>
                 </a:solidFill>
@@ -9313,7 +9314,7 @@
             </a:ln>
             <a:extLst>
               <a:ext uri="{91240B29-F687-4f45-9708-019B960494DF}">
-                <a14:hiddenLine xmlns="" xmlns:a14="http://schemas.microsoft.com/office/drawing/2010/main" w="9525">
+                <a14:hiddenLine xmlns:a14="http://schemas.microsoft.com/office/drawing/2010/main" xmlns="" w="9525">
                   <a:solidFill>
                     <a:srgbClr val="000000"/>
                   </a:solidFill>
@@ -11322,7 +11323,7 @@
             </a:ln>
             <a:extLst>
               <a:ext uri="{91240B29-F687-4f45-9708-019B960494DF}">
-                <a14:hiddenLine xmlns="" xmlns:a14="http://schemas.microsoft.com/office/drawing/2010/main" w="9525">
+                <a14:hiddenLine xmlns:a14="http://schemas.microsoft.com/office/drawing/2010/main" xmlns="" w="9525">
                   <a:solidFill>
                     <a:srgbClr val="000000"/>
                   </a:solidFill>
@@ -12397,7 +12398,7 @@
             </a:ln>
             <a:extLst>
               <a:ext uri="{91240B29-F687-4f45-9708-019B960494DF}">
-                <a14:hiddenLine xmlns="" xmlns:a14="http://schemas.microsoft.com/office/drawing/2010/main" w="9525">
+                <a14:hiddenLine xmlns:a14="http://schemas.microsoft.com/office/drawing/2010/main" xmlns="" w="9525">
                   <a:solidFill>
                     <a:srgbClr val="000000"/>
                   </a:solidFill>
@@ -13464,7 +13465,7 @@
             </a:ln>
             <a:extLst>
               <a:ext uri="{91240B29-F687-4f45-9708-019B960494DF}">
-                <a14:hiddenLine xmlns="" xmlns:a14="http://schemas.microsoft.com/office/drawing/2010/main" w="9525">
+                <a14:hiddenLine xmlns:a14="http://schemas.microsoft.com/office/drawing/2010/main" xmlns="" w="9525">
                   <a:solidFill>
                     <a:srgbClr val="000000"/>
                   </a:solidFill>
@@ -14254,6 +14255,109 @@
 </p:sld>
 </file>
 
+<file path=ppt/slides/slide10.xml><?xml version="1.0" encoding="utf-8"?>
+<p:sld xmlns:a="http://schemas.openxmlformats.org/drawingml/2006/main" xmlns:r="http://schemas.openxmlformats.org/officeDocument/2006/relationships" xmlns:p="http://schemas.openxmlformats.org/presentationml/2006/main">
+  <p:cSld>
+    <p:spTree>
+      <p:nvGrpSpPr>
+        <p:cNvPr id="1" name=""/>
+        <p:cNvGrpSpPr/>
+        <p:nvPr/>
+      </p:nvGrpSpPr>
+      <p:grpSpPr>
+        <a:xfrm>
+          <a:off x="0" y="0"/>
+          <a:ext cx="0" cy="0"/>
+          <a:chOff x="0" y="0"/>
+          <a:chExt cx="0" cy="0"/>
+        </a:xfrm>
+      </p:grpSpPr>
+      <p:sp>
+        <p:nvSpPr>
+          <p:cNvPr id="2" name="Titel 1"/>
+          <p:cNvSpPr>
+            <a:spLocks noGrp="1"/>
+          </p:cNvSpPr>
+          <p:nvPr>
+            <p:ph type="title"/>
+          </p:nvPr>
+        </p:nvSpPr>
+        <p:spPr/>
+        <p:txBody>
+          <a:bodyPr/>
+          <a:lstStyle/>
+          <a:p>
+            <a:r>
+              <a:rPr lang="de-CH" dirty="0" smtClean="0"/>
+              <a:t>Ende</a:t>
+            </a:r>
+            <a:endParaRPr lang="en-GB" dirty="0"/>
+          </a:p>
+        </p:txBody>
+      </p:sp>
+      <p:pic>
+        <p:nvPicPr>
+          <p:cNvPr id="2050" name="Picture 2" descr="http://einfachgefragt.com.dd20604.kasserver.com/wp-content/uploads/2013/08/Cartoon-Psychiater.jpg"/>
+          <p:cNvPicPr>
+            <a:picLocks noGrp="1" noChangeAspect="1" noChangeArrowheads="1"/>
+          </p:cNvPicPr>
+          <p:nvPr>
+            <p:ph idx="1"/>
+          </p:nvPr>
+        </p:nvPicPr>
+        <p:blipFill>
+          <a:blip r:embed="rId2" cstate="email">
+            <a:extLst>
+              <a:ext uri="{28A0092B-C50C-407E-A947-70E740481C1C}">
+                <a14:useLocalDpi xmlns:a14="http://schemas.microsoft.com/office/drawing/2010/main" val="0"/>
+              </a:ext>
+            </a:extLst>
+          </a:blip>
+          <a:srcRect/>
+          <a:stretch>
+            <a:fillRect/>
+          </a:stretch>
+        </p:blipFill>
+        <p:spPr bwMode="auto">
+          <a:xfrm>
+            <a:off x="2792573" y="2489200"/>
+            <a:ext cx="3530600" cy="3530600"/>
+          </a:xfrm>
+          <a:prstGeom prst="rect">
+            <a:avLst/>
+          </a:prstGeom>
+          <a:noFill/>
+          <a:extLst>
+            <a:ext uri="{909E8E84-426E-40DD-AFC4-6F175D3DCCD1}">
+              <a14:hiddenFill xmlns:a14="http://schemas.microsoft.com/office/drawing/2010/main">
+                <a:solidFill>
+                  <a:srgbClr val="FFFFFF"/>
+                </a:solidFill>
+              </a14:hiddenFill>
+            </a:ext>
+          </a:extLst>
+        </p:spPr>
+      </p:pic>
+    </p:spTree>
+    <p:extLst>
+      <p:ext uri="{BB962C8B-B14F-4D97-AF65-F5344CB8AC3E}">
+        <p14:creationId xmlns:p14="http://schemas.microsoft.com/office/powerpoint/2010/main" val="3881861182"/>
+      </p:ext>
+    </p:extLst>
+  </p:cSld>
+  <p:clrMapOvr>
+    <a:masterClrMapping/>
+  </p:clrMapOvr>
+  <p:timing>
+    <p:tnLst>
+      <p:par>
+        <p:cTn id="1" dur="indefinite" restart="never" nodeType="tmRoot"/>
+      </p:par>
+    </p:tnLst>
+  </p:timing>
+</p:sld>
+</file>
+
 <file path=ppt/slides/slide2.xml><?xml version="1.0" encoding="utf-8"?>
 <p:sld xmlns:a="http://schemas.openxmlformats.org/drawingml/2006/main" xmlns:r="http://schemas.openxmlformats.org/officeDocument/2006/relationships" xmlns:p="http://schemas.openxmlformats.org/presentationml/2006/main">
   <p:cSld>
@@ -14660,7 +14764,6 @@
               <a:rPr lang="de-DE" dirty="0" smtClean="0"/>
               <a:t>Erfahrung aus beruflichem Alltag</a:t>
             </a:r>
-            <a:endParaRPr lang="de-DE" dirty="0" smtClean="0"/>
           </a:p>
         </p:txBody>
       </p:sp>
@@ -15053,7 +15156,6 @@
               <a:rPr lang="de-DE" dirty="0"/>
               <a:t>Design (Storyboards I)</a:t>
             </a:r>
-            <a:endParaRPr lang="de-DE" dirty="0"/>
           </a:p>
         </p:txBody>
       </p:sp>
@@ -15286,72 +15388,50 @@
           <a:p>
             <a:r>
               <a:rPr lang="de-CH" dirty="0" smtClean="0"/>
-              <a:t>Ende</a:t>
+              <a:t>Validation</a:t>
             </a:r>
             <a:endParaRPr lang="en-GB" dirty="0"/>
           </a:p>
         </p:txBody>
       </p:sp>
-      <p:pic>
-        <p:nvPicPr>
-          <p:cNvPr id="2050" name="Picture 2" descr="http://einfachgefragt.com.dd20604.kasserver.com/wp-content/uploads/2013/08/Cartoon-Psychiater.jpg"/>
-          <p:cNvPicPr>
-            <a:picLocks noGrp="1" noChangeAspect="1" noChangeArrowheads="1"/>
-          </p:cNvPicPr>
+      <p:sp>
+        <p:nvSpPr>
+          <p:cNvPr id="3" name="Inhaltsplatzhalter 2"/>
+          <p:cNvSpPr>
+            <a:spLocks noGrp="1"/>
+          </p:cNvSpPr>
           <p:nvPr>
             <p:ph idx="1"/>
           </p:nvPr>
-        </p:nvPicPr>
-        <p:blipFill>
-          <a:blip r:embed="rId2" cstate="email">
-            <a:extLst>
-              <a:ext uri="{28A0092B-C50C-407E-A947-70E740481C1C}">
-                <a14:useLocalDpi xmlns:a14="http://schemas.microsoft.com/office/drawing/2010/main" val="0"/>
-              </a:ext>
-            </a:extLst>
-          </a:blip>
-          <a:srcRect/>
-          <a:stretch>
-            <a:fillRect/>
-          </a:stretch>
-        </p:blipFill>
-        <p:spPr bwMode="auto">
-          <a:xfrm>
-            <a:off x="2792573" y="2489200"/>
-            <a:ext cx="3530600" cy="3530600"/>
-          </a:xfrm>
-          <a:prstGeom prst="rect">
-            <a:avLst/>
-          </a:prstGeom>
-          <a:noFill/>
-          <a:extLst>
-            <a:ext uri="{909E8E84-426E-40DD-AFC4-6F175D3DCCD1}">
-              <a14:hiddenFill xmlns:a14="http://schemas.microsoft.com/office/drawing/2010/main">
-                <a:solidFill>
-                  <a:srgbClr val="FFFFFF"/>
-                </a:solidFill>
-              </a14:hiddenFill>
-            </a:ext>
-          </a:extLst>
-        </p:spPr>
-      </p:pic>
+        </p:nvSpPr>
+        <p:spPr/>
+        <p:txBody>
+          <a:bodyPr/>
+          <a:lstStyle/>
+          <a:p>
+            <a:r>
+              <a:rPr lang="de-CH" dirty="0" smtClean="0"/>
+              <a:t>Peer-Feedback</a:t>
+            </a:r>
+          </a:p>
+          <a:p>
+            <a:pPr marL="0" indent="0">
+              <a:buNone/>
+            </a:pPr>
+            <a:endParaRPr lang="en-GB" dirty="0"/>
+          </a:p>
+        </p:txBody>
+      </p:sp>
     </p:spTree>
     <p:extLst>
       <p:ext uri="{BB962C8B-B14F-4D97-AF65-F5344CB8AC3E}">
-        <p14:creationId xmlns:p14="http://schemas.microsoft.com/office/powerpoint/2010/main" val="3881861182"/>
+        <p14:creationId xmlns:p14="http://schemas.microsoft.com/office/powerpoint/2010/main" val="331918503"/>
       </p:ext>
     </p:extLst>
   </p:cSld>
   <p:clrMapOvr>
     <a:masterClrMapping/>
   </p:clrMapOvr>
-  <p:timing>
-    <p:tnLst>
-      <p:par>
-        <p:cTn id="1" dur="indefinite" restart="never" nodeType="tmRoot"/>
-      </p:par>
-    </p:tnLst>
-  </p:timing>
 </p:sld>
 </file>
 

</xml_diff>